<commit_message>
Added some changes plus new stuff
</commit_message>
<xml_diff>
--- a/ppt/Indoor Locationing.pptx
+++ b/ppt/Indoor Locationing.pptx
@@ -2,12 +2,12 @@
 <file path=ppt/presentation.xml><?xml version="1.0" encoding="utf-8"?>
 <p:presentation xmlns:a="http://schemas.openxmlformats.org/drawingml/2006/main" xmlns:r="http://schemas.openxmlformats.org/officeDocument/2006/relationships" xmlns:p="http://schemas.openxmlformats.org/presentationml/2006/main" saveSubsetFonts="1">
   <p:sldMasterIdLst>
-    <p:sldMasterId id="2147484092" r:id="rId1"/>
+    <p:sldMasterId id="2147484164" r:id="rId1"/>
   </p:sldMasterIdLst>
   <p:sldIdLst>
     <p:sldId id="256" r:id="rId2"/>
-    <p:sldId id="258" r:id="rId3"/>
-    <p:sldId id="266" r:id="rId4"/>
+    <p:sldId id="268" r:id="rId3"/>
+    <p:sldId id="258" r:id="rId4"/>
     <p:sldId id="257" r:id="rId5"/>
     <p:sldId id="259" r:id="rId6"/>
     <p:sldId id="264" r:id="rId7"/>
@@ -15,8 +15,7 @@
     <p:sldId id="261" r:id="rId9"/>
     <p:sldId id="262" r:id="rId10"/>
     <p:sldId id="263" r:id="rId11"/>
-    <p:sldId id="267" r:id="rId12"/>
-    <p:sldId id="265" r:id="rId13"/>
+    <p:sldId id="269" r:id="rId12"/>
   </p:sldIdLst>
   <p:sldSz cx="9144000" cy="6858000" type="screen4x3"/>
   <p:notesSz cx="6858000" cy="9144000"/>
@@ -354,7 +353,7 @@
           <a:p>
             <a:fld id="{DF6225D8-C1C6-43E2-B42E-97B930EE9EB3}" type="datetimeFigureOut">
               <a:rPr lang="en-US" smtClean="0"/>
-              <a:t>24-Nov-12</a:t>
+              <a:t>27-Nov-12</a:t>
             </a:fld>
             <a:endParaRPr lang="en-US"/>
           </a:p>
@@ -632,7 +631,7 @@
           <a:p>
             <a:fld id="{DF6225D8-C1C6-43E2-B42E-97B930EE9EB3}" type="datetimeFigureOut">
               <a:rPr lang="en-US" smtClean="0"/>
-              <a:t>24-Nov-12</a:t>
+              <a:t>27-Nov-12</a:t>
             </a:fld>
             <a:endParaRPr lang="en-US"/>
           </a:p>
@@ -855,7 +854,7 @@
           <a:p>
             <a:fld id="{DF6225D8-C1C6-43E2-B42E-97B930EE9EB3}" type="datetimeFigureOut">
               <a:rPr lang="en-US" smtClean="0"/>
-              <a:t>24-Nov-12</a:t>
+              <a:t>27-Nov-12</a:t>
             </a:fld>
             <a:endParaRPr lang="en-US"/>
           </a:p>
@@ -1050,7 +1049,7 @@
           <a:p>
             <a:fld id="{DF6225D8-C1C6-43E2-B42E-97B930EE9EB3}" type="datetimeFigureOut">
               <a:rPr lang="en-US" smtClean="0"/>
-              <a:t>24-Nov-12</a:t>
+              <a:t>27-Nov-12</a:t>
             </a:fld>
             <a:endParaRPr lang="en-US"/>
           </a:p>
@@ -1330,7 +1329,7 @@
           <a:p>
             <a:fld id="{DF6225D8-C1C6-43E2-B42E-97B930EE9EB3}" type="datetimeFigureOut">
               <a:rPr lang="en-US" smtClean="0"/>
-              <a:t>24-Nov-12</a:t>
+              <a:t>27-Nov-12</a:t>
             </a:fld>
             <a:endParaRPr lang="en-US"/>
           </a:p>
@@ -1803,7 +1802,7 @@
           <a:p>
             <a:fld id="{DF6225D8-C1C6-43E2-B42E-97B930EE9EB3}" type="datetimeFigureOut">
               <a:rPr lang="en-US" smtClean="0"/>
-              <a:t>24-Nov-12</a:t>
+              <a:t>27-Nov-12</a:t>
             </a:fld>
             <a:endParaRPr lang="en-US"/>
           </a:p>
@@ -2258,7 +2257,7 @@
           <a:p>
             <a:fld id="{DF6225D8-C1C6-43E2-B42E-97B930EE9EB3}" type="datetimeFigureOut">
               <a:rPr lang="en-US" smtClean="0"/>
-              <a:t>24-Nov-12</a:t>
+              <a:t>27-Nov-12</a:t>
             </a:fld>
             <a:endParaRPr lang="en-US"/>
           </a:p>
@@ -2396,7 +2395,7 @@
           <a:p>
             <a:fld id="{DF6225D8-C1C6-43E2-B42E-97B930EE9EB3}" type="datetimeFigureOut">
               <a:rPr lang="en-US" smtClean="0"/>
-              <a:t>24-Nov-12</a:t>
+              <a:t>27-Nov-12</a:t>
             </a:fld>
             <a:endParaRPr lang="en-US"/>
           </a:p>
@@ -2557,7 +2556,7 @@
           <a:p>
             <a:fld id="{DF6225D8-C1C6-43E2-B42E-97B930EE9EB3}" type="datetimeFigureOut">
               <a:rPr lang="en-US" smtClean="0"/>
-              <a:t>24-Nov-12</a:t>
+              <a:t>27-Nov-12</a:t>
             </a:fld>
             <a:endParaRPr lang="en-US"/>
           </a:p>
@@ -2951,7 +2950,7 @@
           <a:p>
             <a:fld id="{DF6225D8-C1C6-43E2-B42E-97B930EE9EB3}" type="datetimeFigureOut">
               <a:rPr lang="en-US" smtClean="0"/>
-              <a:t>24-Nov-12</a:t>
+              <a:t>27-Nov-12</a:t>
             </a:fld>
             <a:endParaRPr lang="en-US"/>
           </a:p>
@@ -3351,7 +3350,7 @@
           <a:p>
             <a:fld id="{DF6225D8-C1C6-43E2-B42E-97B930EE9EB3}" type="datetimeFigureOut">
               <a:rPr lang="en-US" smtClean="0"/>
-              <a:t>24-Nov-12</a:t>
+              <a:t>27-Nov-12</a:t>
             </a:fld>
             <a:endParaRPr lang="en-US"/>
           </a:p>
@@ -3561,7 +3560,7 @@
           <a:p>
             <a:fld id="{DF6225D8-C1C6-43E2-B42E-97B930EE9EB3}" type="datetimeFigureOut">
               <a:rPr lang="en-US" smtClean="0"/>
-              <a:t>24-Nov-12</a:t>
+              <a:t>27-Nov-12</a:t>
             </a:fld>
             <a:endParaRPr lang="en-US"/>
           </a:p>
@@ -3653,17 +3652,17 @@
   </p:cSld>
   <p:clrMap bg1="dk1" tx1="lt1" bg2="dk2" tx2="lt2" accent1="accent1" accent2="accent2" accent3="accent3" accent4="accent4" accent5="accent5" accent6="accent6" hlink="hlink" folHlink="folHlink"/>
   <p:sldLayoutIdLst>
-    <p:sldLayoutId id="2147484093" r:id="rId1"/>
-    <p:sldLayoutId id="2147484094" r:id="rId2"/>
-    <p:sldLayoutId id="2147484095" r:id="rId3"/>
-    <p:sldLayoutId id="2147484096" r:id="rId4"/>
-    <p:sldLayoutId id="2147484097" r:id="rId5"/>
-    <p:sldLayoutId id="2147484098" r:id="rId6"/>
-    <p:sldLayoutId id="2147484099" r:id="rId7"/>
-    <p:sldLayoutId id="2147484100" r:id="rId8"/>
-    <p:sldLayoutId id="2147484101" r:id="rId9"/>
-    <p:sldLayoutId id="2147484102" r:id="rId10"/>
-    <p:sldLayoutId id="2147484103" r:id="rId11"/>
+    <p:sldLayoutId id="2147484165" r:id="rId1"/>
+    <p:sldLayoutId id="2147484166" r:id="rId2"/>
+    <p:sldLayoutId id="2147484167" r:id="rId3"/>
+    <p:sldLayoutId id="2147484168" r:id="rId4"/>
+    <p:sldLayoutId id="2147484169" r:id="rId5"/>
+    <p:sldLayoutId id="2147484170" r:id="rId6"/>
+    <p:sldLayoutId id="2147484171" r:id="rId7"/>
+    <p:sldLayoutId id="2147484172" r:id="rId8"/>
+    <p:sldLayoutId id="2147484173" r:id="rId9"/>
+    <p:sldLayoutId id="2147484174" r:id="rId10"/>
+    <p:sldLayoutId id="2147484175" r:id="rId11"/>
   </p:sldLayoutIdLst>
   <p:txStyles>
     <p:titleStyle>
@@ -4057,7 +4056,11 @@
           <a:p>
             <a:r>
               <a:rPr lang="en-US" dirty="0" smtClean="0"/>
-              <a:t>Indoor Locationing</a:t>
+              <a:t>Indoor </a:t>
+            </a:r>
+            <a:r>
+              <a:rPr lang="en-US" dirty="0"/>
+              <a:t>localization</a:t>
             </a:r>
             <a:endParaRPr lang="en-US" dirty="0"/>
           </a:p>
@@ -4257,9 +4260,31 @@
               <a:buChar char="•"/>
             </a:pPr>
             <a:r>
+              <a:rPr lang="en-US" dirty="0" err="1" smtClean="0"/>
+              <a:t>Bilton</a:t>
+            </a:r>
+            <a:r>
               <a:rPr lang="en-US" dirty="0" smtClean="0"/>
-              <a:t>Mobile devices – used widely</a:t>
-            </a:r>
+              <a:t>, 2012, </a:t>
+            </a:r>
+            <a:r>
+              <a:rPr lang="en-US" dirty="0"/>
+              <a:t>Samsung, Nokia, and Qualcomm team up to improve indoor location </a:t>
+            </a:r>
+            <a:r>
+              <a:rPr lang="en-US" dirty="0" smtClean="0"/>
+              <a:t>technology</a:t>
+            </a:r>
+            <a:br>
+              <a:rPr lang="en-US" dirty="0" smtClean="0"/>
+            </a:br>
+            <a:r>
+              <a:rPr lang="en-US" dirty="0" smtClean="0">
+                <a:hlinkClick r:id="rId2"/>
+              </a:rPr>
+              <a:t>http://venturebeat.com/2012/08/23/samsung-nokia-and-qualcomm-team-up-to-improve-indoor-location-technology/</a:t>
+            </a:r>
+            <a:endParaRPr lang="en-US" dirty="0" smtClean="0"/>
           </a:p>
           <a:p>
             <a:pPr marL="285750" indent="-285750">
@@ -4267,8 +4292,28 @@
               <a:buChar char="•"/>
             </a:pPr>
             <a:r>
+              <a:rPr lang="en-US" dirty="0" err="1" smtClean="0"/>
+              <a:t>Pu</a:t>
+            </a:r>
+            <a:r>
+              <a:rPr lang="en-US" dirty="0"/>
+              <a:t> </a:t>
+            </a:r>
+            <a:r>
+              <a:rPr lang="en-US" i="1" dirty="0" smtClean="0"/>
+              <a:t>et al.</a:t>
+            </a:r>
+            <a:r>
               <a:rPr lang="en-US" dirty="0" smtClean="0"/>
-              <a:t>Augmented reality</a:t>
+              <a:t>, </a:t>
+            </a:r>
+            <a:r>
+              <a:rPr lang="en-US" dirty="0"/>
+              <a:t>Indoor Location Tracking using Received Signal Strength </a:t>
+            </a:r>
+            <a:r>
+              <a:rPr lang="en-US" dirty="0" smtClean="0"/>
+              <a:t>Indicator</a:t>
             </a:r>
           </a:p>
           <a:p>
@@ -4276,113 +4321,31 @@
               <a:buFont typeface="Arial" pitchFamily="34" charset="0"/>
               <a:buChar char="•"/>
             </a:pPr>
+            <a:endParaRPr lang="en-US" dirty="0" smtClean="0"/>
+          </a:p>
+          <a:p>
+            <a:endParaRPr lang="en-US" dirty="0"/>
+          </a:p>
+        </p:txBody>
+      </p:sp>
+      <p:sp>
+        <p:nvSpPr>
+          <p:cNvPr id="3" name="Title 2"/>
+          <p:cNvSpPr>
+            <a:spLocks noGrp="1"/>
+          </p:cNvSpPr>
+          <p:nvPr>
+            <p:ph type="title"/>
+          </p:nvPr>
+        </p:nvSpPr>
+        <p:spPr/>
+        <p:txBody>
+          <a:bodyPr/>
+          <a:lstStyle/>
+          <a:p>
             <a:r>
               <a:rPr lang="en-US" dirty="0" smtClean="0"/>
-              <a:t>School </a:t>
-            </a:r>
-            <a:r>
-              <a:rPr lang="en-US" dirty="0"/>
-              <a:t>Campus </a:t>
-            </a:r>
-            <a:r>
-              <a:rPr lang="en-US" dirty="0" smtClean="0"/>
-              <a:t>(</a:t>
-            </a:r>
-            <a:r>
-              <a:rPr lang="en-US" dirty="0" smtClean="0">
-                <a:hlinkClick r:id="rId2"/>
-              </a:rPr>
-              <a:t>www.campusguiden.no</a:t>
-            </a:r>
-            <a:r>
-              <a:rPr lang="en-US" dirty="0" smtClean="0"/>
-              <a:t>)</a:t>
-            </a:r>
-          </a:p>
-          <a:p>
-            <a:pPr marL="285750" indent="-285750">
-              <a:buFont typeface="Arial" pitchFamily="34" charset="0"/>
-              <a:buChar char="•"/>
-            </a:pPr>
-            <a:r>
-              <a:rPr lang="en-US" dirty="0"/>
-              <a:t>Guided tours of </a:t>
-            </a:r>
-            <a:r>
-              <a:rPr lang="en-US" dirty="0" smtClean="0"/>
-              <a:t>museums</a:t>
-            </a:r>
-          </a:p>
-          <a:p>
-            <a:pPr marL="285750" indent="-285750">
-              <a:buFont typeface="Arial" pitchFamily="34" charset="0"/>
-              <a:buChar char="•"/>
-            </a:pPr>
-            <a:r>
-              <a:rPr lang="en-US" dirty="0"/>
-              <a:t>Mall and airport </a:t>
-            </a:r>
-            <a:r>
-              <a:rPr lang="en-US" dirty="0" smtClean="0"/>
-              <a:t>maps</a:t>
-            </a:r>
-          </a:p>
-          <a:p>
-            <a:pPr marL="285750" indent="-285750">
-              <a:buFont typeface="Arial" pitchFamily="34" charset="0"/>
-              <a:buChar char="•"/>
-            </a:pPr>
-            <a:r>
-              <a:rPr lang="en-US" dirty="0"/>
-              <a:t>Store </a:t>
-            </a:r>
-            <a:r>
-              <a:rPr lang="en-US" dirty="0" smtClean="0"/>
-              <a:t>navigation</a:t>
-            </a:r>
-          </a:p>
-          <a:p>
-            <a:pPr marL="285750" indent="-285750">
-              <a:buFont typeface="Arial" pitchFamily="34" charset="0"/>
-              <a:buChar char="•"/>
-            </a:pPr>
-            <a:r>
-              <a:rPr lang="en-US"/>
-              <a:t>Targeted </a:t>
-            </a:r>
-            <a:r>
-              <a:rPr lang="en-US" smtClean="0"/>
-              <a:t>advertising</a:t>
-            </a:r>
-            <a:endParaRPr lang="en-US" dirty="0" smtClean="0"/>
-          </a:p>
-          <a:p>
-            <a:pPr marL="285750" indent="-285750">
-              <a:buFont typeface="Arial" pitchFamily="34" charset="0"/>
-              <a:buChar char="•"/>
-            </a:pPr>
-            <a:endParaRPr lang="en-US" dirty="0"/>
-          </a:p>
-        </p:txBody>
-      </p:sp>
-      <p:sp>
-        <p:nvSpPr>
-          <p:cNvPr id="3" name="Title 2"/>
-          <p:cNvSpPr>
-            <a:spLocks noGrp="1"/>
-          </p:cNvSpPr>
-          <p:nvPr>
-            <p:ph type="title"/>
-          </p:nvPr>
-        </p:nvSpPr>
-        <p:spPr/>
-        <p:txBody>
-          <a:bodyPr/>
-          <a:lstStyle/>
-          <a:p>
-            <a:r>
-              <a:rPr lang="en-US" dirty="0" smtClean="0"/>
-              <a:t>Practical Uses</a:t>
+              <a:t>References</a:t>
             </a:r>
             <a:endParaRPr lang="en-US" dirty="0"/>
           </a:p>
@@ -4391,66 +4354,7 @@
     </p:spTree>
     <p:extLst>
       <p:ext uri="{BB962C8B-B14F-4D97-AF65-F5344CB8AC3E}">
-        <p14:creationId xmlns:p14="http://schemas.microsoft.com/office/powerpoint/2010/main" val="2890970502"/>
-      </p:ext>
-    </p:extLst>
-  </p:cSld>
-  <p:clrMapOvr>
-    <a:masterClrMapping/>
-  </p:clrMapOvr>
-</p:sld>
-</file>
-
-<file path=ppt/slides/slide12.xml><?xml version="1.0" encoding="utf-8"?>
-<p:sld xmlns:a="http://schemas.openxmlformats.org/drawingml/2006/main" xmlns:r="http://schemas.openxmlformats.org/officeDocument/2006/relationships" xmlns:p="http://schemas.openxmlformats.org/presentationml/2006/main">
-  <p:cSld>
-    <p:spTree>
-      <p:nvGrpSpPr>
-        <p:cNvPr id="1" name=""/>
-        <p:cNvGrpSpPr/>
-        <p:nvPr/>
-      </p:nvGrpSpPr>
-      <p:grpSpPr>
-        <a:xfrm>
-          <a:off x="0" y="0"/>
-          <a:ext cx="0" cy="0"/>
-          <a:chOff x="0" y="0"/>
-          <a:chExt cx="0" cy="0"/>
-        </a:xfrm>
-      </p:grpSpPr>
-      <p:sp>
-        <p:nvSpPr>
-          <p:cNvPr id="3" name="Title 2"/>
-          <p:cNvSpPr>
-            <a:spLocks noGrp="1"/>
-          </p:cNvSpPr>
-          <p:nvPr>
-            <p:ph type="title"/>
-          </p:nvPr>
-        </p:nvSpPr>
-        <p:spPr>
-          <a:xfrm>
-            <a:off x="731520" y="2895600"/>
-            <a:ext cx="7680960" cy="1066800"/>
-          </a:xfrm>
-        </p:spPr>
-        <p:txBody>
-          <a:bodyPr/>
-          <a:lstStyle/>
-          <a:p>
-            <a:pPr algn="ctr"/>
-            <a:r>
-              <a:rPr lang="en-US" dirty="0" smtClean="0"/>
-              <a:t>Questions?</a:t>
-            </a:r>
-            <a:endParaRPr lang="en-US" dirty="0"/>
-          </a:p>
-        </p:txBody>
-      </p:sp>
-    </p:spTree>
-    <p:extLst>
-      <p:ext uri="{BB962C8B-B14F-4D97-AF65-F5344CB8AC3E}">
-        <p14:creationId xmlns:p14="http://schemas.microsoft.com/office/powerpoint/2010/main" val="1327454069"/>
+        <p14:creationId xmlns:p14="http://schemas.microsoft.com/office/powerpoint/2010/main" val="4222382498"/>
       </p:ext>
     </p:extLst>
   </p:cSld>
@@ -4489,9 +4393,7 @@
         </p:nvSpPr>
         <p:spPr/>
         <p:txBody>
-          <a:bodyPr>
-            <a:normAutofit/>
-          </a:bodyPr>
+          <a:bodyPr/>
           <a:lstStyle/>
           <a:p>
             <a:pPr marL="285750" indent="-285750">
@@ -4500,7 +4402,7 @@
             </a:pPr>
             <a:r>
               <a:rPr lang="en-US" dirty="0" smtClean="0"/>
-              <a:t>Accuracy of positioning techniques</a:t>
+              <a:t>It is not GPS!</a:t>
             </a:r>
           </a:p>
           <a:p>
@@ -4510,7 +4412,7 @@
             </a:pPr>
             <a:r>
               <a:rPr lang="en-US" dirty="0" smtClean="0"/>
-              <a:t>Ranging methods</a:t>
+              <a:t>GPS uses satellite navigation system. Always works near the Earth’s surface! Accuracy rate 10 – 100m</a:t>
             </a:r>
           </a:p>
           <a:p>
@@ -4520,17 +4422,89 @@
             </a:pPr>
             <a:r>
               <a:rPr lang="en-US" dirty="0" smtClean="0"/>
-              <a:t>Security and privacy</a:t>
-            </a:r>
-          </a:p>
+              <a:t>Indoor locationing uses Wi-Fi, Bluetooth or special sensory</a:t>
+            </a:r>
+            <a:endParaRPr lang="en-US" dirty="0"/>
+          </a:p>
+        </p:txBody>
+      </p:sp>
+      <p:sp>
+        <p:nvSpPr>
+          <p:cNvPr id="3" name="Title 2"/>
+          <p:cNvSpPr>
+            <a:spLocks noGrp="1"/>
+          </p:cNvSpPr>
+          <p:nvPr>
+            <p:ph type="title"/>
+          </p:nvPr>
+        </p:nvSpPr>
+        <p:spPr/>
+        <p:txBody>
+          <a:bodyPr/>
+          <a:lstStyle/>
+          <a:p>
+            <a:r>
+              <a:rPr lang="en-US" dirty="0" smtClean="0"/>
+              <a:t>What is it?</a:t>
+            </a:r>
+            <a:endParaRPr lang="en-US" dirty="0"/>
+          </a:p>
+        </p:txBody>
+      </p:sp>
+    </p:spTree>
+    <p:extLst>
+      <p:ext uri="{BB962C8B-B14F-4D97-AF65-F5344CB8AC3E}">
+        <p14:creationId xmlns:p14="http://schemas.microsoft.com/office/powerpoint/2010/main" val="2606365696"/>
+      </p:ext>
+    </p:extLst>
+  </p:cSld>
+  <p:clrMapOvr>
+    <a:masterClrMapping/>
+  </p:clrMapOvr>
+</p:sld>
+</file>
+
+<file path=ppt/slides/slide3.xml><?xml version="1.0" encoding="utf-8"?>
+<p:sld xmlns:a="http://schemas.openxmlformats.org/drawingml/2006/main" xmlns:r="http://schemas.openxmlformats.org/officeDocument/2006/relationships" xmlns:p="http://schemas.openxmlformats.org/presentationml/2006/main">
+  <p:cSld>
+    <p:spTree>
+      <p:nvGrpSpPr>
+        <p:cNvPr id="1" name=""/>
+        <p:cNvGrpSpPr/>
+        <p:nvPr/>
+      </p:nvGrpSpPr>
+      <p:grpSpPr>
+        <a:xfrm>
+          <a:off x="0" y="0"/>
+          <a:ext cx="0" cy="0"/>
+          <a:chOff x="0" y="0"/>
+          <a:chExt cx="0" cy="0"/>
+        </a:xfrm>
+      </p:grpSpPr>
+      <p:sp>
+        <p:nvSpPr>
+          <p:cNvPr id="2" name="Content Placeholder 1"/>
+          <p:cNvSpPr>
+            <a:spLocks noGrp="1"/>
+          </p:cNvSpPr>
+          <p:nvPr>
+            <p:ph sz="quarter" idx="13"/>
+          </p:nvPr>
+        </p:nvSpPr>
+        <p:spPr/>
+        <p:txBody>
+          <a:bodyPr>
+            <a:normAutofit/>
+          </a:bodyPr>
+          <a:lstStyle/>
           <a:p>
             <a:pPr marL="285750" indent="-285750">
               <a:buFont typeface="Arial" pitchFamily="34" charset="0"/>
               <a:buChar char="•"/>
             </a:pPr>
             <a:r>
-              <a:rPr lang="en-US" dirty="0" smtClean="0"/>
-              <a:t>Device availability</a:t>
+              <a:rPr lang="en-US" dirty="0"/>
+              <a:t>Mobile devices – used widely</a:t>
             </a:r>
           </a:p>
           <a:p>
@@ -4539,13 +4513,14 @@
               <a:buChar char="•"/>
             </a:pPr>
             <a:r>
-              <a:rPr lang="en-US" dirty="0" err="1" smtClean="0"/>
-              <a:t>WSN</a:t>
+              <a:rPr lang="en-US" dirty="0"/>
+              <a:t>Augmented </a:t>
             </a:r>
             <a:r>
               <a:rPr lang="en-US" dirty="0" smtClean="0"/>
-              <a:t> deployment restriction</a:t>
-            </a:r>
+              <a:t>reality – interactive video games</a:t>
+            </a:r>
+            <a:endParaRPr lang="en-US" dirty="0"/>
           </a:p>
           <a:p>
             <a:pPr marL="285750" indent="-285750">
@@ -4554,7 +4529,17 @@
             </a:pPr>
             <a:r>
               <a:rPr lang="en-US" dirty="0" smtClean="0"/>
-              <a:t>Network scale</a:t>
+              <a:t>Campus maps (</a:t>
+            </a:r>
+            <a:r>
+              <a:rPr lang="en-US" dirty="0" smtClean="0">
+                <a:hlinkClick r:id="rId2"/>
+              </a:rPr>
+              <a:t>www.campusguiden.no</a:t>
+            </a:r>
+            <a:r>
+              <a:rPr lang="en-US" dirty="0"/>
+              <a:t>)</a:t>
             </a:r>
           </a:p>
           <a:p>
@@ -4563,8 +4548,8 @@
               <a:buChar char="•"/>
             </a:pPr>
             <a:r>
-              <a:rPr lang="en-US" dirty="0" smtClean="0"/>
-              <a:t>Implementation cost</a:t>
+              <a:rPr lang="en-US" dirty="0"/>
+              <a:t>Guided tours of museums</a:t>
             </a:r>
           </a:p>
           <a:p>
@@ -4573,8 +4558,53 @@
               <a:buChar char="•"/>
             </a:pPr>
             <a:r>
+              <a:rPr lang="en-US" dirty="0"/>
+              <a:t>Mall and airport </a:t>
+            </a:r>
+            <a:r>
               <a:rPr lang="en-US" dirty="0" smtClean="0"/>
-              <a:t>Etc.</a:t>
+              <a:t>maps</a:t>
+            </a:r>
+            <a:endParaRPr lang="en-US" dirty="0"/>
+          </a:p>
+          <a:p>
+            <a:pPr marL="285750" indent="-285750">
+              <a:buFont typeface="Arial" pitchFamily="34" charset="0"/>
+              <a:buChar char="•"/>
+            </a:pPr>
+            <a:r>
+              <a:rPr lang="en-US" dirty="0" smtClean="0"/>
+              <a:t>Targeted advertising</a:t>
+            </a:r>
+          </a:p>
+          <a:p>
+            <a:r>
+              <a:rPr lang="en-US" dirty="0" smtClean="0"/>
+              <a:t>Already there:</a:t>
+            </a:r>
+          </a:p>
+          <a:p>
+            <a:pPr marL="285750" indent="-285750">
+              <a:buFont typeface="Arial" pitchFamily="34" charset="0"/>
+              <a:buChar char="•"/>
+            </a:pPr>
+            <a:r>
+              <a:rPr lang="en-US" dirty="0"/>
+              <a:t>Microsoft’s RADAR (signal strength map of a building)</a:t>
+            </a:r>
+          </a:p>
+          <a:p>
+            <a:pPr marL="285750" indent="-285750">
+              <a:buFont typeface="Arial" pitchFamily="34" charset="0"/>
+              <a:buChar char="•"/>
+            </a:pPr>
+            <a:r>
+              <a:rPr lang="en-US" dirty="0"/>
+              <a:t>Active Bat from AT&amp;T (ultrasonic detectors</a:t>
+            </a:r>
+            <a:r>
+              <a:rPr lang="en-US" dirty="0" smtClean="0"/>
+              <a:t>)</a:t>
             </a:r>
             <a:endParaRPr lang="en-US" dirty="0"/>
           </a:p>
@@ -4630,108 +4660,6 @@
       </p:par>
     </p:tnLst>
   </p:timing>
-</p:sld>
-</file>
-
-<file path=ppt/slides/slide3.xml><?xml version="1.0" encoding="utf-8"?>
-<p:sld xmlns:a="http://schemas.openxmlformats.org/drawingml/2006/main" xmlns:r="http://schemas.openxmlformats.org/officeDocument/2006/relationships" xmlns:p="http://schemas.openxmlformats.org/presentationml/2006/main">
-  <p:cSld>
-    <p:spTree>
-      <p:nvGrpSpPr>
-        <p:cNvPr id="1" name=""/>
-        <p:cNvGrpSpPr/>
-        <p:nvPr/>
-      </p:nvGrpSpPr>
-      <p:grpSpPr>
-        <a:xfrm>
-          <a:off x="0" y="0"/>
-          <a:ext cx="0" cy="0"/>
-          <a:chOff x="0" y="0"/>
-          <a:chExt cx="0" cy="0"/>
-        </a:xfrm>
-      </p:grpSpPr>
-      <p:sp>
-        <p:nvSpPr>
-          <p:cNvPr id="2" name="Content Placeholder 1"/>
-          <p:cNvSpPr>
-            <a:spLocks noGrp="1"/>
-          </p:cNvSpPr>
-          <p:nvPr>
-            <p:ph sz="quarter" idx="13"/>
-          </p:nvPr>
-        </p:nvSpPr>
-        <p:spPr/>
-        <p:txBody>
-          <a:bodyPr/>
-          <a:lstStyle/>
-          <a:p>
-            <a:pPr marL="285750" indent="-285750">
-              <a:buFont typeface="Arial" pitchFamily="34" charset="0"/>
-              <a:buChar char="•"/>
-            </a:pPr>
-            <a:r>
-              <a:rPr lang="en-US" dirty="0"/>
-              <a:t>Microsoft’s RADAR </a:t>
-            </a:r>
-            <a:r>
-              <a:rPr lang="en-US" dirty="0" smtClean="0"/>
-              <a:t>(signal strength </a:t>
-            </a:r>
-            <a:r>
-              <a:rPr lang="en-US" dirty="0"/>
-              <a:t>map of a building)</a:t>
-            </a:r>
-            <a:endParaRPr lang="en-US" dirty="0" smtClean="0"/>
-          </a:p>
-          <a:p>
-            <a:pPr marL="285750" indent="-285750">
-              <a:buFont typeface="Arial" pitchFamily="34" charset="0"/>
-              <a:buChar char="•"/>
-            </a:pPr>
-            <a:r>
-              <a:rPr lang="en-US" dirty="0" smtClean="0"/>
-              <a:t>Active Bat </a:t>
-            </a:r>
-            <a:r>
-              <a:rPr lang="en-US" dirty="0"/>
-              <a:t>from AT&amp;T (ultrasonic detectors)</a:t>
-            </a:r>
-          </a:p>
-        </p:txBody>
-      </p:sp>
-      <p:sp>
-        <p:nvSpPr>
-          <p:cNvPr id="3" name="Title 2"/>
-          <p:cNvSpPr>
-            <a:spLocks noGrp="1"/>
-          </p:cNvSpPr>
-          <p:nvPr>
-            <p:ph type="title"/>
-          </p:nvPr>
-        </p:nvSpPr>
-        <p:spPr/>
-        <p:txBody>
-          <a:bodyPr/>
-          <a:lstStyle/>
-          <a:p>
-            <a:r>
-              <a:rPr lang="en-US" dirty="0" smtClean="0"/>
-              <a:t>What is already out there?</a:t>
-            </a:r>
-            <a:endParaRPr lang="en-US" dirty="0"/>
-          </a:p>
-        </p:txBody>
-      </p:sp>
-    </p:spTree>
-    <p:extLst>
-      <p:ext uri="{BB962C8B-B14F-4D97-AF65-F5344CB8AC3E}">
-        <p14:creationId xmlns:p14="http://schemas.microsoft.com/office/powerpoint/2010/main" val="2950971109"/>
-      </p:ext>
-    </p:extLst>
-  </p:cSld>
-  <p:clrMapOvr>
-    <a:masterClrMapping/>
-  </p:clrMapOvr>
 </p:sld>
 </file>
 
@@ -5667,7 +5595,9 @@
         </p:nvSpPr>
         <p:spPr/>
         <p:txBody>
-          <a:bodyPr/>
+          <a:bodyPr>
+            <a:normAutofit/>
+          </a:bodyPr>
           <a:lstStyle/>
           <a:p>
             <a:r>
@@ -5773,7 +5703,9 @@
         </p:nvSpPr>
         <p:spPr/>
         <p:txBody>
-          <a:bodyPr/>
+          <a:bodyPr>
+            <a:normAutofit/>
+          </a:bodyPr>
           <a:lstStyle/>
           <a:p>
             <a:pPr marL="285750" indent="-285750">
@@ -5792,11 +5724,7 @@
             </a:pPr>
             <a:r>
               <a:rPr lang="en-US" dirty="0" smtClean="0"/>
-              <a:t>Inexpensive </a:t>
-            </a:r>
-            <a:r>
-              <a:rPr lang="en-US" dirty="0" smtClean="0"/>
-              <a:t>devices</a:t>
+              <a:t>Inexpensive devices</a:t>
             </a:r>
           </a:p>
           <a:p>
@@ -5808,7 +5736,6 @@
               <a:rPr lang="en-US" dirty="0" smtClean="0"/>
               <a:t>No special equipment required</a:t>
             </a:r>
-            <a:endParaRPr lang="en-US" dirty="0" smtClean="0"/>
           </a:p>
           <a:p>
             <a:pPr marL="285750" indent="-285750">

</xml_diff>